<commit_message>
Minor fixes for "05. Multidimentional Arrays" slides
</commit_message>
<xml_diff>
--- a/Courses/Software-Sciences/Module-2-DS-and-Algo-New/05-Multidimentional-Arrays/05-Multidimentional-Arrays.pptx
+++ b/Courses/Software-Sciences/Module-2-DS-and-Algo-New/05-Multidimentional-Arrays/05-Multidimentional-Arrays.pptx
@@ -313,7 +313,7 @@
           <a:p>
             <a:fld id="{4E087215-0C8F-4762-A664-737A353EC9A4}" type="datetimeFigureOut">
               <a:rPr lang="bg-BG" smtClean="0"/>
-              <a:t>18.1.2023 г.</a:t>
+              <a:t>27.01.23 г.</a:t>
             </a:fld>
             <a:endParaRPr lang="bg-BG"/>
           </a:p>
@@ -504,7 +504,7 @@
           <a:p>
             <a:fld id="{72D84649-876A-46C9-8472-14CB09C070D8}" type="datetimeFigureOut">
               <a:rPr lang="en-US" smtClean="0"/>
-              <a:t>1/18/2023</a:t>
+              <a:t>1/27/23</a:t>
             </a:fld>
             <a:endParaRPr lang="en-US"/>
           </a:p>
@@ -926,6 +926,247 @@
 </p:notes>
 </file>
 
+<file path=ppt/notesSlides/notesSlide10.xml><?xml version="1.0" encoding="utf-8"?>
+<p:notes xmlns:a="http://schemas.openxmlformats.org/drawingml/2006/main" xmlns:r="http://schemas.openxmlformats.org/officeDocument/2006/relationships" xmlns:p="http://schemas.openxmlformats.org/presentationml/2006/main">
+  <p:cSld>
+    <p:spTree>
+      <p:nvGrpSpPr>
+        <p:cNvPr id="1" name=""/>
+        <p:cNvGrpSpPr/>
+        <p:nvPr/>
+      </p:nvGrpSpPr>
+      <p:grpSpPr>
+        <a:xfrm>
+          <a:off x="0" y="0"/>
+          <a:ext cx="0" cy="0"/>
+          <a:chOff x="0" y="0"/>
+          <a:chExt cx="0" cy="0"/>
+        </a:xfrm>
+      </p:grpSpPr>
+      <p:sp>
+        <p:nvSpPr>
+          <p:cNvPr id="2" name="Slide Image Placeholder 1"/>
+          <p:cNvSpPr>
+            <a:spLocks noGrp="1" noRot="1" noChangeAspect="1"/>
+          </p:cNvSpPr>
+          <p:nvPr>
+            <p:ph type="sldImg"/>
+          </p:nvPr>
+        </p:nvSpPr>
+        <p:spPr/>
+      </p:sp>
+      <p:sp>
+        <p:nvSpPr>
+          <p:cNvPr id="3" name="Notes Placeholder 2"/>
+          <p:cNvSpPr>
+            <a:spLocks noGrp="1"/>
+          </p:cNvSpPr>
+          <p:nvPr>
+            <p:ph type="body" idx="1"/>
+          </p:nvPr>
+        </p:nvSpPr>
+        <p:spPr/>
+        <p:txBody>
+          <a:bodyPr/>
+          <a:lstStyle/>
+          <a:p>
+            <a:endParaRPr lang="en-US"/>
+          </a:p>
+        </p:txBody>
+      </p:sp>
+      <p:sp>
+        <p:nvSpPr>
+          <p:cNvPr id="6" name="Slide Number Placeholder 5">
+            <a:extLst>
+              <a:ext uri="{FF2B5EF4-FFF2-40B4-BE49-F238E27FC236}">
+                <a16:creationId xmlns:a16="http://schemas.microsoft.com/office/drawing/2014/main" id="{6627548A-4D3C-449B-81A5-FA4BE4628490}"/>
+              </a:ext>
+            </a:extLst>
+          </p:cNvPr>
+          <p:cNvSpPr txBox="1">
+            <a:spLocks/>
+          </p:cNvSpPr>
+          <p:nvPr/>
+        </p:nvSpPr>
+        <p:spPr>
+          <a:xfrm>
+            <a:off x="6488999" y="8847000"/>
+            <a:ext cx="367414" cy="297000"/>
+          </a:xfrm>
+          <a:prstGeom prst="rect">
+            <a:avLst/>
+          </a:prstGeom>
+        </p:spPr>
+        <p:txBody>
+          <a:bodyPr vert="horz" lIns="91440" tIns="45720" rIns="91440" bIns="45720" rtlCol="0" anchor="b"/>
+          <a:lstStyle>
+            <a:defPPr>
+              <a:defRPr lang="en-US"/>
+            </a:defPPr>
+            <a:lvl1pPr marL="0" algn="r" defTabSz="914400" rtl="0" eaLnBrk="1" latinLnBrk="0" hangingPunct="1">
+              <a:defRPr sz="1200" kern="1200">
+                <a:solidFill>
+                  <a:schemeClr val="tx1"/>
+                </a:solidFill>
+                <a:latin typeface="+mn-lt"/>
+                <a:ea typeface="+mn-ea"/>
+                <a:cs typeface="+mn-cs"/>
+              </a:defRPr>
+            </a:lvl1pPr>
+            <a:lvl2pPr marL="457200" algn="l" defTabSz="914400" rtl="0" eaLnBrk="1" latinLnBrk="0" hangingPunct="1">
+              <a:defRPr sz="1800" kern="1200">
+                <a:solidFill>
+                  <a:schemeClr val="tx1"/>
+                </a:solidFill>
+                <a:latin typeface="+mn-lt"/>
+                <a:ea typeface="+mn-ea"/>
+                <a:cs typeface="+mn-cs"/>
+              </a:defRPr>
+            </a:lvl2pPr>
+            <a:lvl3pPr marL="914400" algn="l" defTabSz="914400" rtl="0" eaLnBrk="1" latinLnBrk="0" hangingPunct="1">
+              <a:defRPr sz="1800" kern="1200">
+                <a:solidFill>
+                  <a:schemeClr val="tx1"/>
+                </a:solidFill>
+                <a:latin typeface="+mn-lt"/>
+                <a:ea typeface="+mn-ea"/>
+                <a:cs typeface="+mn-cs"/>
+              </a:defRPr>
+            </a:lvl3pPr>
+            <a:lvl4pPr marL="1371600" algn="l" defTabSz="914400" rtl="0" eaLnBrk="1" latinLnBrk="0" hangingPunct="1">
+              <a:defRPr sz="1800" kern="1200">
+                <a:solidFill>
+                  <a:schemeClr val="tx1"/>
+                </a:solidFill>
+                <a:latin typeface="+mn-lt"/>
+                <a:ea typeface="+mn-ea"/>
+                <a:cs typeface="+mn-cs"/>
+              </a:defRPr>
+            </a:lvl4pPr>
+            <a:lvl5pPr marL="1828800" algn="l" defTabSz="914400" rtl="0" eaLnBrk="1" latinLnBrk="0" hangingPunct="1">
+              <a:defRPr sz="1800" kern="1200">
+                <a:solidFill>
+                  <a:schemeClr val="tx1"/>
+                </a:solidFill>
+                <a:latin typeface="+mn-lt"/>
+                <a:ea typeface="+mn-ea"/>
+                <a:cs typeface="+mn-cs"/>
+              </a:defRPr>
+            </a:lvl5pPr>
+            <a:lvl6pPr marL="2286000" algn="l" defTabSz="914400" rtl="0" eaLnBrk="1" latinLnBrk="0" hangingPunct="1">
+              <a:defRPr sz="1800" kern="1200">
+                <a:solidFill>
+                  <a:schemeClr val="tx1"/>
+                </a:solidFill>
+                <a:latin typeface="+mn-lt"/>
+                <a:ea typeface="+mn-ea"/>
+                <a:cs typeface="+mn-cs"/>
+              </a:defRPr>
+            </a:lvl6pPr>
+            <a:lvl7pPr marL="2743200" algn="l" defTabSz="914400" rtl="0" eaLnBrk="1" latinLnBrk="0" hangingPunct="1">
+              <a:defRPr sz="1800" kern="1200">
+                <a:solidFill>
+                  <a:schemeClr val="tx1"/>
+                </a:solidFill>
+                <a:latin typeface="+mn-lt"/>
+                <a:ea typeface="+mn-ea"/>
+                <a:cs typeface="+mn-cs"/>
+              </a:defRPr>
+            </a:lvl7pPr>
+            <a:lvl8pPr marL="3200400" algn="l" defTabSz="914400" rtl="0" eaLnBrk="1" latinLnBrk="0" hangingPunct="1">
+              <a:defRPr sz="1800" kern="1200">
+                <a:solidFill>
+                  <a:schemeClr val="tx1"/>
+                </a:solidFill>
+                <a:latin typeface="+mn-lt"/>
+                <a:ea typeface="+mn-ea"/>
+                <a:cs typeface="+mn-cs"/>
+              </a:defRPr>
+            </a:lvl8pPr>
+            <a:lvl9pPr marL="3657600" algn="l" defTabSz="914400" rtl="0" eaLnBrk="1" latinLnBrk="0" hangingPunct="1">
+              <a:defRPr sz="1800" kern="1200">
+                <a:solidFill>
+                  <a:schemeClr val="tx1"/>
+                </a:solidFill>
+                <a:latin typeface="+mn-lt"/>
+                <a:ea typeface="+mn-ea"/>
+                <a:cs typeface="+mn-cs"/>
+              </a:defRPr>
+            </a:lvl9pPr>
+          </a:lstStyle>
+          <a:p>
+            <a:fld id="{3EBA5BD7-F043-4D1B-AA17-CD412FC534DE}" type="slidenum">
+              <a:rPr lang="en-US" smtClean="0"/>
+              <a:pPr/>
+              <a:t>30</a:t>
+            </a:fld>
+            <a:endParaRPr lang="en-US"/>
+          </a:p>
+        </p:txBody>
+      </p:sp>
+      <p:sp>
+        <p:nvSpPr>
+          <p:cNvPr id="7" name="Footer Placeholder 7">
+            <a:extLst>
+              <a:ext uri="{FF2B5EF4-FFF2-40B4-BE49-F238E27FC236}">
+                <a16:creationId xmlns:a16="http://schemas.microsoft.com/office/drawing/2014/main" id="{6440DE1F-FF39-450B-9BB2-FD91A9B92021}"/>
+              </a:ext>
+            </a:extLst>
+          </p:cNvPr>
+          <p:cNvSpPr>
+            <a:spLocks noGrp="1"/>
+          </p:cNvSpPr>
+          <p:nvPr>
+            <p:ph type="ftr" sz="quarter" idx="4"/>
+          </p:nvPr>
+        </p:nvSpPr>
+        <p:spPr>
+          <a:xfrm>
+            <a:off x="-1" y="8847000"/>
+            <a:ext cx="6488999" cy="297000"/>
+          </a:xfrm>
+          <a:prstGeom prst="rect">
+            <a:avLst/>
+          </a:prstGeom>
+        </p:spPr>
+        <p:txBody>
+          <a:bodyPr vert="horz" lIns="91440" tIns="45720" rIns="91440" bIns="45720" rtlCol="0" anchor="b"/>
+          <a:lstStyle>
+            <a:lvl1pPr algn="l">
+              <a:defRPr sz="1100"/>
+            </a:lvl1pPr>
+          </a:lstStyle>
+          <a:p>
+            <a:r>
+              <a:rPr lang="en-US"/>
+              <a:t>© SoftUni – </a:t>
+            </a:r>
+            <a:r>
+              <a:rPr lang="en-US" u="sng">
+                <a:hlinkClick r:id="rId3"/>
+              </a:rPr>
+              <a:t>https://softuni.org</a:t>
+            </a:r>
+            <a:r>
+              <a:rPr lang="en-US"/>
+              <a:t>. Copyrighted document. Unauthorized copy or reproduction is not permitted.</a:t>
+            </a:r>
+          </a:p>
+        </p:txBody>
+      </p:sp>
+    </p:spTree>
+    <p:extLst>
+      <p:ext uri="{BB962C8B-B14F-4D97-AF65-F5344CB8AC3E}">
+        <p14:creationId xmlns:p14="http://schemas.microsoft.com/office/powerpoint/2010/main" val="2767550425"/>
+      </p:ext>
+    </p:extLst>
+  </p:cSld>
+  <p:clrMapOvr>
+    <a:masterClrMapping/>
+  </p:clrMapOvr>
+</p:notes>
+</file>
+
 <file path=ppt/notesSlides/notesSlide2.xml><?xml version="1.0" encoding="utf-8"?>
 <p:notes xmlns:a="http://schemas.openxmlformats.org/drawingml/2006/main" xmlns:r="http://schemas.openxmlformats.org/officeDocument/2006/relationships" xmlns:p="http://schemas.openxmlformats.org/presentationml/2006/main">
   <p:cSld>
@@ -1240,7 +1481,7 @@
           <a:bodyPr/>
           <a:lstStyle/>
           <a:p>
-            <a:endParaRPr lang="en-US" dirty="0"/>
+            <a:endParaRPr lang="en-BG" dirty="0"/>
           </a:p>
         </p:txBody>
       </p:sp>
@@ -1251,7 +1492,7 @@
             <a:spLocks noGrp="1"/>
           </p:cNvSpPr>
           <p:nvPr>
-            <p:ph type="sldNum" sz="quarter" idx="10"/>
+            <p:ph type="sldNum" sz="quarter" idx="5"/>
           </p:nvPr>
         </p:nvSpPr>
         <p:spPr/>
@@ -1259,10 +1500,9 @@
           <a:bodyPr/>
           <a:lstStyle/>
           <a:p>
-            <a:fld id="{3EBA5BD7-F043-4D1B-AA17-CD412FC534DE}" type="slidenum">
+            <a:fld id="{2BF067CD-8E6B-4360-9AA8-C5DF2A48A6D1}" type="slidenum">
               <a:rPr lang="en-US" smtClean="0"/>
-              <a:pPr/>
-              <a:t>18</a:t>
+              <a:t>6</a:t>
             </a:fld>
             <a:endParaRPr lang="en-US" dirty="0"/>
           </a:p>
@@ -1270,13 +1510,7 @@
       </p:sp>
       <p:sp>
         <p:nvSpPr>
-          <p:cNvPr id="7" name="Footer Placeholder 7">
-            <a:extLst>
-              <a:ext uri="{FF2B5EF4-FFF2-40B4-BE49-F238E27FC236}">
-                <a16:creationId xmlns:a16="http://schemas.microsoft.com/office/drawing/2014/main" id="{1BE9DF41-23C9-45FA-9D04-3E940441CF24}"/>
-              </a:ext>
-            </a:extLst>
-          </p:cNvPr>
+          <p:cNvPr id="5" name="Footer Placeholder 4"/>
           <p:cNvSpPr>
             <a:spLocks noGrp="1"/>
           </p:cNvSpPr>
@@ -1284,44 +1518,33 @@
             <p:ph type="ftr" sz="quarter" idx="4"/>
           </p:nvPr>
         </p:nvSpPr>
-        <p:spPr>
-          <a:xfrm>
-            <a:off x="-1" y="8847000"/>
-            <a:ext cx="6488999" cy="297000"/>
-          </a:xfrm>
-          <a:prstGeom prst="rect">
-            <a:avLst/>
-          </a:prstGeom>
-        </p:spPr>
+        <p:spPr/>
         <p:txBody>
-          <a:bodyPr vert="horz" lIns="91440" tIns="45720" rIns="91440" bIns="45720" rtlCol="0" anchor="b"/>
-          <a:lstStyle>
-            <a:lvl1pPr algn="l">
-              <a:defRPr sz="1100"/>
-            </a:lvl1pPr>
-          </a:lstStyle>
-          <a:p>
-            <a:r>
-              <a:rPr lang="en-US" dirty="0"/>
+          <a:bodyPr/>
+          <a:lstStyle/>
+          <a:p>
+            <a:r>
+              <a:rPr lang="en-US"/>
               <a:t>© SoftUni – </a:t>
             </a:r>
             <a:r>
-              <a:rPr lang="en-US" u="sng" dirty="0">
+              <a:rPr lang="en-US" u="sng">
                 <a:hlinkClick r:id="rId3"/>
               </a:rPr>
               <a:t>https://softuni.org</a:t>
             </a:r>
             <a:r>
-              <a:rPr lang="en-US" dirty="0"/>
+              <a:rPr lang="en-US"/>
               <a:t>. Copyrighted document. Unauthorized copy or reproduction is not permitted.</a:t>
             </a:r>
+            <a:endParaRPr lang="en-US" dirty="0"/>
           </a:p>
         </p:txBody>
       </p:sp>
     </p:spTree>
     <p:extLst>
       <p:ext uri="{BB962C8B-B14F-4D97-AF65-F5344CB8AC3E}">
-        <p14:creationId xmlns:p14="http://schemas.microsoft.com/office/powerpoint/2010/main" val="1778742563"/>
+        <p14:creationId xmlns:p14="http://schemas.microsoft.com/office/powerpoint/2010/main" val="4070770690"/>
       </p:ext>
     </p:extLst>
   </p:cSld>
@@ -1381,12 +1604,12 @@
       </p:sp>
       <p:sp>
         <p:nvSpPr>
-          <p:cNvPr id="5" name="Slide Number Placeholder 4"/>
+          <p:cNvPr id="4" name="Slide Number Placeholder 3"/>
           <p:cNvSpPr>
             <a:spLocks noGrp="1"/>
           </p:cNvSpPr>
           <p:nvPr>
-            <p:ph type="sldNum" sz="quarter" idx="11"/>
+            <p:ph type="sldNum" sz="quarter" idx="10"/>
           </p:nvPr>
         </p:nvSpPr>
         <p:spPr/>
@@ -1397,7 +1620,7 @@
             <a:fld id="{3EBA5BD7-F043-4D1B-AA17-CD412FC534DE}" type="slidenum">
               <a:rPr lang="en-US" smtClean="0"/>
               <a:pPr/>
-              <a:t>19</a:t>
+              <a:t>18</a:t>
             </a:fld>
             <a:endParaRPr lang="en-US" dirty="0"/>
           </a:p>
@@ -1408,7 +1631,7 @@
           <p:cNvPr id="7" name="Footer Placeholder 7">
             <a:extLst>
               <a:ext uri="{FF2B5EF4-FFF2-40B4-BE49-F238E27FC236}">
-                <a16:creationId xmlns:a16="http://schemas.microsoft.com/office/drawing/2014/main" id="{B1DDF1CF-E2FB-4AC0-ACF5-267D04B44001}"/>
+                <a16:creationId xmlns:a16="http://schemas.microsoft.com/office/drawing/2014/main" id="{1BE9DF41-23C9-45FA-9D04-3E940441CF24}"/>
               </a:ext>
             </a:extLst>
           </p:cNvPr>
@@ -1456,7 +1679,7 @@
     </p:spTree>
     <p:extLst>
       <p:ext uri="{BB962C8B-B14F-4D97-AF65-F5344CB8AC3E}">
-        <p14:creationId xmlns:p14="http://schemas.microsoft.com/office/powerpoint/2010/main" val="3566991879"/>
+        <p14:creationId xmlns:p14="http://schemas.microsoft.com/office/powerpoint/2010/main" val="1778742563"/>
       </p:ext>
     </p:extLst>
   </p:cSld>
@@ -1532,7 +1755,7 @@
             <a:fld id="{3EBA5BD7-F043-4D1B-AA17-CD412FC534DE}" type="slidenum">
               <a:rPr lang="en-US" smtClean="0"/>
               <a:pPr/>
-              <a:t>20</a:t>
+              <a:t>19</a:t>
             </a:fld>
             <a:endParaRPr lang="en-US" dirty="0"/>
           </a:p>
@@ -1543,7 +1766,7 @@
           <p:cNvPr id="7" name="Footer Placeholder 7">
             <a:extLst>
               <a:ext uri="{FF2B5EF4-FFF2-40B4-BE49-F238E27FC236}">
-                <a16:creationId xmlns:a16="http://schemas.microsoft.com/office/drawing/2014/main" id="{6B4BA1E6-2C58-49AB-A356-874744D5A89C}"/>
+                <a16:creationId xmlns:a16="http://schemas.microsoft.com/office/drawing/2014/main" id="{B1DDF1CF-E2FB-4AC0-ACF5-267D04B44001}"/>
               </a:ext>
             </a:extLst>
           </p:cNvPr>
@@ -1591,7 +1814,7 @@
     </p:spTree>
     <p:extLst>
       <p:ext uri="{BB962C8B-B14F-4D97-AF65-F5344CB8AC3E}">
-        <p14:creationId xmlns:p14="http://schemas.microsoft.com/office/powerpoint/2010/main" val="3926670139"/>
+        <p14:creationId xmlns:p14="http://schemas.microsoft.com/office/powerpoint/2010/main" val="3566991879"/>
       </p:ext>
     </p:extLst>
   </p:cSld>
@@ -1667,7 +1890,7 @@
             <a:fld id="{3EBA5BD7-F043-4D1B-AA17-CD412FC534DE}" type="slidenum">
               <a:rPr lang="en-US" smtClean="0"/>
               <a:pPr/>
-              <a:t>28</a:t>
+              <a:t>20</a:t>
             </a:fld>
             <a:endParaRPr lang="en-US" dirty="0"/>
           </a:p>
@@ -1678,7 +1901,7 @@
           <p:cNvPr id="7" name="Footer Placeholder 7">
             <a:extLst>
               <a:ext uri="{FF2B5EF4-FFF2-40B4-BE49-F238E27FC236}">
-                <a16:creationId xmlns:a16="http://schemas.microsoft.com/office/drawing/2014/main" id="{55010F51-CABD-4860-831D-C0A9CB0810F2}"/>
+                <a16:creationId xmlns:a16="http://schemas.microsoft.com/office/drawing/2014/main" id="{6B4BA1E6-2C58-49AB-A356-874744D5A89C}"/>
               </a:ext>
             </a:extLst>
           </p:cNvPr>
@@ -1726,7 +1949,7 @@
     </p:spTree>
     <p:extLst>
       <p:ext uri="{BB962C8B-B14F-4D97-AF65-F5344CB8AC3E}">
-        <p14:creationId xmlns:p14="http://schemas.microsoft.com/office/powerpoint/2010/main" val="1988001691"/>
+        <p14:creationId xmlns:p14="http://schemas.microsoft.com/office/powerpoint/2010/main" val="3926670139"/>
       </p:ext>
     </p:extLst>
   </p:cSld>
@@ -1780,146 +2003,40 @@
           <a:bodyPr/>
           <a:lstStyle/>
           <a:p>
-            <a:endParaRPr lang="en-US"/>
+            <a:endParaRPr lang="en-US" dirty="0"/>
           </a:p>
         </p:txBody>
       </p:sp>
       <p:sp>
         <p:nvSpPr>
-          <p:cNvPr id="7" name="Slide Number Placeholder 5">
-            <a:extLst>
-              <a:ext uri="{FF2B5EF4-FFF2-40B4-BE49-F238E27FC236}">
-                <a16:creationId xmlns:a16="http://schemas.microsoft.com/office/drawing/2014/main" id="{5049B984-F964-47FF-8179-0A3007CE21CD}"/>
-              </a:ext>
-            </a:extLst>
-          </p:cNvPr>
-          <p:cNvSpPr txBox="1">
-            <a:spLocks/>
+          <p:cNvPr id="5" name="Slide Number Placeholder 4"/>
+          <p:cNvSpPr>
+            <a:spLocks noGrp="1"/>
           </p:cNvSpPr>
-          <p:nvPr/>
+          <p:nvPr>
+            <p:ph type="sldNum" sz="quarter" idx="11"/>
+          </p:nvPr>
         </p:nvSpPr>
-        <p:spPr>
-          <a:xfrm>
-            <a:off x="6488999" y="8847000"/>
-            <a:ext cx="367414" cy="297000"/>
-          </a:xfrm>
-          <a:prstGeom prst="rect">
-            <a:avLst/>
-          </a:prstGeom>
-        </p:spPr>
+        <p:spPr/>
         <p:txBody>
-          <a:bodyPr vert="horz" lIns="91440" tIns="45720" rIns="91440" bIns="45720" rtlCol="0" anchor="b"/>
-          <a:lstStyle>
-            <a:defPPr>
-              <a:defRPr lang="en-US"/>
-            </a:defPPr>
-            <a:lvl1pPr marL="0" algn="r" defTabSz="914400" rtl="0" eaLnBrk="1" latinLnBrk="0" hangingPunct="1">
-              <a:defRPr sz="1200" kern="1200">
-                <a:solidFill>
-                  <a:schemeClr val="tx1"/>
-                </a:solidFill>
-                <a:latin typeface="+mn-lt"/>
-                <a:ea typeface="+mn-ea"/>
-                <a:cs typeface="+mn-cs"/>
-              </a:defRPr>
-            </a:lvl1pPr>
-            <a:lvl2pPr marL="457200" algn="l" defTabSz="914400" rtl="0" eaLnBrk="1" latinLnBrk="0" hangingPunct="1">
-              <a:defRPr sz="1800" kern="1200">
-                <a:solidFill>
-                  <a:schemeClr val="tx1"/>
-                </a:solidFill>
-                <a:latin typeface="+mn-lt"/>
-                <a:ea typeface="+mn-ea"/>
-                <a:cs typeface="+mn-cs"/>
-              </a:defRPr>
-            </a:lvl2pPr>
-            <a:lvl3pPr marL="914400" algn="l" defTabSz="914400" rtl="0" eaLnBrk="1" latinLnBrk="0" hangingPunct="1">
-              <a:defRPr sz="1800" kern="1200">
-                <a:solidFill>
-                  <a:schemeClr val="tx1"/>
-                </a:solidFill>
-                <a:latin typeface="+mn-lt"/>
-                <a:ea typeface="+mn-ea"/>
-                <a:cs typeface="+mn-cs"/>
-              </a:defRPr>
-            </a:lvl3pPr>
-            <a:lvl4pPr marL="1371600" algn="l" defTabSz="914400" rtl="0" eaLnBrk="1" latinLnBrk="0" hangingPunct="1">
-              <a:defRPr sz="1800" kern="1200">
-                <a:solidFill>
-                  <a:schemeClr val="tx1"/>
-                </a:solidFill>
-                <a:latin typeface="+mn-lt"/>
-                <a:ea typeface="+mn-ea"/>
-                <a:cs typeface="+mn-cs"/>
-              </a:defRPr>
-            </a:lvl4pPr>
-            <a:lvl5pPr marL="1828800" algn="l" defTabSz="914400" rtl="0" eaLnBrk="1" latinLnBrk="0" hangingPunct="1">
-              <a:defRPr sz="1800" kern="1200">
-                <a:solidFill>
-                  <a:schemeClr val="tx1"/>
-                </a:solidFill>
-                <a:latin typeface="+mn-lt"/>
-                <a:ea typeface="+mn-ea"/>
-                <a:cs typeface="+mn-cs"/>
-              </a:defRPr>
-            </a:lvl5pPr>
-            <a:lvl6pPr marL="2286000" algn="l" defTabSz="914400" rtl="0" eaLnBrk="1" latinLnBrk="0" hangingPunct="1">
-              <a:defRPr sz="1800" kern="1200">
-                <a:solidFill>
-                  <a:schemeClr val="tx1"/>
-                </a:solidFill>
-                <a:latin typeface="+mn-lt"/>
-                <a:ea typeface="+mn-ea"/>
-                <a:cs typeface="+mn-cs"/>
-              </a:defRPr>
-            </a:lvl6pPr>
-            <a:lvl7pPr marL="2743200" algn="l" defTabSz="914400" rtl="0" eaLnBrk="1" latinLnBrk="0" hangingPunct="1">
-              <a:defRPr sz="1800" kern="1200">
-                <a:solidFill>
-                  <a:schemeClr val="tx1"/>
-                </a:solidFill>
-                <a:latin typeface="+mn-lt"/>
-                <a:ea typeface="+mn-ea"/>
-                <a:cs typeface="+mn-cs"/>
-              </a:defRPr>
-            </a:lvl7pPr>
-            <a:lvl8pPr marL="3200400" algn="l" defTabSz="914400" rtl="0" eaLnBrk="1" latinLnBrk="0" hangingPunct="1">
-              <a:defRPr sz="1800" kern="1200">
-                <a:solidFill>
-                  <a:schemeClr val="tx1"/>
-                </a:solidFill>
-                <a:latin typeface="+mn-lt"/>
-                <a:ea typeface="+mn-ea"/>
-                <a:cs typeface="+mn-cs"/>
-              </a:defRPr>
-            </a:lvl8pPr>
-            <a:lvl9pPr marL="3657600" algn="l" defTabSz="914400" rtl="0" eaLnBrk="1" latinLnBrk="0" hangingPunct="1">
-              <a:defRPr sz="1800" kern="1200">
-                <a:solidFill>
-                  <a:schemeClr val="tx1"/>
-                </a:solidFill>
-                <a:latin typeface="+mn-lt"/>
-                <a:ea typeface="+mn-ea"/>
-                <a:cs typeface="+mn-cs"/>
-              </a:defRPr>
-            </a:lvl9pPr>
-          </a:lstStyle>
+          <a:bodyPr/>
+          <a:lstStyle/>
           <a:p>
             <a:fld id="{3EBA5BD7-F043-4D1B-AA17-CD412FC534DE}" type="slidenum">
               <a:rPr lang="en-US" smtClean="0"/>
               <a:pPr/>
-              <a:t>29</a:t>
+              <a:t>28</a:t>
             </a:fld>
-            <a:endParaRPr lang="en-US"/>
+            <a:endParaRPr lang="en-US" dirty="0"/>
           </a:p>
         </p:txBody>
       </p:sp>
       <p:sp>
         <p:nvSpPr>
-          <p:cNvPr id="6" name="Footer Placeholder 7">
+          <p:cNvPr id="7" name="Footer Placeholder 7">
             <a:extLst>
               <a:ext uri="{FF2B5EF4-FFF2-40B4-BE49-F238E27FC236}">
-                <a16:creationId xmlns:a16="http://schemas.microsoft.com/office/drawing/2014/main" id="{9CFE5E97-8D68-4134-8407-17031A0C4EE4}"/>
+                <a16:creationId xmlns:a16="http://schemas.microsoft.com/office/drawing/2014/main" id="{55010F51-CABD-4860-831D-C0A9CB0810F2}"/>
               </a:ext>
             </a:extLst>
           </p:cNvPr>
@@ -1948,17 +2065,17 @@
           </a:lstStyle>
           <a:p>
             <a:r>
-              <a:rPr lang="en-US"/>
+              <a:rPr lang="en-US" dirty="0"/>
               <a:t>© SoftUni – </a:t>
             </a:r>
             <a:r>
-              <a:rPr lang="en-US" u="sng">
+              <a:rPr lang="en-US" u="sng" dirty="0">
                 <a:hlinkClick r:id="rId3"/>
               </a:rPr>
               <a:t>https://softuni.org</a:t>
             </a:r>
             <a:r>
-              <a:rPr lang="en-US"/>
+              <a:rPr lang="en-US" dirty="0"/>
               <a:t>. Copyrighted document. Unauthorized copy or reproduction is not permitted.</a:t>
             </a:r>
           </a:p>
@@ -1967,7 +2084,7 @@
     </p:spTree>
     <p:extLst>
       <p:ext uri="{BB962C8B-B14F-4D97-AF65-F5344CB8AC3E}">
-        <p14:creationId xmlns:p14="http://schemas.microsoft.com/office/powerpoint/2010/main" val="93676303"/>
+        <p14:creationId xmlns:p14="http://schemas.microsoft.com/office/powerpoint/2010/main" val="1988001691"/>
       </p:ext>
     </p:extLst>
   </p:cSld>
@@ -2027,10 +2144,10 @@
       </p:sp>
       <p:sp>
         <p:nvSpPr>
-          <p:cNvPr id="6" name="Slide Number Placeholder 5">
+          <p:cNvPr id="7" name="Slide Number Placeholder 5">
             <a:extLst>
               <a:ext uri="{FF2B5EF4-FFF2-40B4-BE49-F238E27FC236}">
-                <a16:creationId xmlns:a16="http://schemas.microsoft.com/office/drawing/2014/main" id="{6627548A-4D3C-449B-81A5-FA4BE4628490}"/>
+                <a16:creationId xmlns:a16="http://schemas.microsoft.com/office/drawing/2014/main" id="{5049B984-F964-47FF-8179-0A3007CE21CD}"/>
               </a:ext>
             </a:extLst>
           </p:cNvPr>
@@ -2149,7 +2266,7 @@
             <a:fld id="{3EBA5BD7-F043-4D1B-AA17-CD412FC534DE}" type="slidenum">
               <a:rPr lang="en-US" smtClean="0"/>
               <a:pPr/>
-              <a:t>30</a:t>
+              <a:t>29</a:t>
             </a:fld>
             <a:endParaRPr lang="en-US"/>
           </a:p>
@@ -2157,10 +2274,10 @@
       </p:sp>
       <p:sp>
         <p:nvSpPr>
-          <p:cNvPr id="7" name="Footer Placeholder 7">
+          <p:cNvPr id="6" name="Footer Placeholder 7">
             <a:extLst>
               <a:ext uri="{FF2B5EF4-FFF2-40B4-BE49-F238E27FC236}">
-                <a16:creationId xmlns:a16="http://schemas.microsoft.com/office/drawing/2014/main" id="{6440DE1F-FF39-450B-9BB2-FD91A9B92021}"/>
+                <a16:creationId xmlns:a16="http://schemas.microsoft.com/office/drawing/2014/main" id="{9CFE5E97-8D68-4134-8407-17031A0C4EE4}"/>
               </a:ext>
             </a:extLst>
           </p:cNvPr>
@@ -2208,7 +2325,7 @@
     </p:spTree>
     <p:extLst>
       <p:ext uri="{BB962C8B-B14F-4D97-AF65-F5344CB8AC3E}">
-        <p14:creationId xmlns:p14="http://schemas.microsoft.com/office/powerpoint/2010/main" val="2767550425"/>
+        <p14:creationId xmlns:p14="http://schemas.microsoft.com/office/powerpoint/2010/main" val="93676303"/>
       </p:ext>
     </p:extLst>
   </p:cSld>
@@ -8810,27 +8927,13 @@
           <a:lstStyle/>
           <a:p>
             <a:r>
-              <a:rPr lang="en-US" sz="4750" dirty="0" err="1">
+              <a:rPr lang="bg-BG" sz="4750" dirty="0">
                 <a:ea typeface="+mj-lt"/>
                 <a:cs typeface="+mj-lt"/>
               </a:rPr>
-              <a:t>Многомерни</a:t>
-            </a:r>
-            <a:r>
-              <a:rPr lang="en-US" sz="4750" dirty="0">
-                <a:ea typeface="+mj-lt"/>
-                <a:cs typeface="+mj-lt"/>
-              </a:rPr>
-              <a:t> </a:t>
-            </a:r>
-            <a:r>
-              <a:rPr lang="en-US" sz="4750" dirty="0" err="1">
-                <a:ea typeface="+mj-lt"/>
-                <a:cs typeface="+mj-lt"/>
-              </a:rPr>
-              <a:t>масиви</a:t>
-            </a:r>
-            <a:endParaRPr lang="bg-BG">
+              <a:t>Многомерни масиви</a:t>
+            </a:r>
+            <a:endParaRPr lang="bg-BG" dirty="0">
               <a:cs typeface="Calibri"/>
             </a:endParaRPr>
           </a:p>
@@ -10952,8 +11055,8 @@
           </a:xfrm>
           <a:prstGeom prst="wedgeRoundRectCallout">
             <a:avLst>
-              <a:gd name="adj1" fmla="val -59525"/>
-              <a:gd name="adj2" fmla="val -51443"/>
+              <a:gd name="adj1" fmla="val -58466"/>
+              <a:gd name="adj2" fmla="val -44036"/>
               <a:gd name="adj3" fmla="val 16667"/>
             </a:avLst>
           </a:prstGeom>
@@ -11021,7 +11124,10 @@
             <a:r>
               <a:rPr lang="en-US" sz="2350" b="1" dirty="0" err="1">
                 <a:solidFill>
-                  <a:srgbClr val="FFFFFF"/>
+                  <a:schemeClr val="bg1">
+                    <a:lumMod val="60000"/>
+                    <a:lumOff val="40000"/>
+                  </a:schemeClr>
                 </a:solidFill>
                 <a:ea typeface="+mn-lt"/>
                 <a:cs typeface="+mn-lt"/>
@@ -11061,7 +11167,10 @@
             <a:r>
               <a:rPr lang="en-US" sz="2350" b="1" dirty="0" err="1">
                 <a:solidFill>
-                  <a:srgbClr val="FFFFFF"/>
+                  <a:schemeClr val="bg1">
+                    <a:lumMod val="60000"/>
+                    <a:lumOff val="40000"/>
+                  </a:schemeClr>
                 </a:solidFill>
                 <a:ea typeface="+mn-lt"/>
                 <a:cs typeface="+mn-lt"/>
@@ -11133,8 +11242,8 @@
         </p:nvSpPr>
         <p:spPr bwMode="auto">
           <a:xfrm>
-            <a:off x="7407643" y="3457486"/>
-            <a:ext cx="4755829" cy="896308"/>
+            <a:off x="7619673" y="3473193"/>
+            <a:ext cx="4133357" cy="896308"/>
           </a:xfrm>
           <a:prstGeom prst="wedgeRoundRectCallout">
             <a:avLst>
@@ -11207,7 +11316,10 @@
             <a:r>
               <a:rPr lang="en-US" sz="2350" b="1" dirty="0" err="1">
                 <a:solidFill>
-                  <a:srgbClr val="FFFFFF"/>
+                  <a:schemeClr val="bg1">
+                    <a:lumMod val="60000"/>
+                    <a:lumOff val="40000"/>
+                  </a:schemeClr>
                 </a:solidFill>
                 <a:ea typeface="+mn-lt"/>
                 <a:cs typeface="+mn-lt"/>
@@ -11244,45 +11356,73 @@
               </a:rPr>
               <a:t> </a:t>
             </a:r>
-            <a:r>
-              <a:rPr lang="en-US" sz="2350" b="1" dirty="0" err="1">
+            <a:br>
+              <a:rPr lang="en-US" sz="2350" b="1" dirty="0">
                 <a:solidFill>
                   <a:srgbClr val="FFFFFF"/>
                 </a:solidFill>
                 <a:ea typeface="+mn-lt"/>
                 <a:cs typeface="+mn-lt"/>
               </a:rPr>
-              <a:t>нулевото</a:t>
-            </a:r>
-            <a:r>
-              <a:rPr lang="en-US" sz="2350" b="1" dirty="0">
-                <a:solidFill>
-                  <a:srgbClr val="FFFFFF"/>
+            </a:br>
+            <a:r>
+              <a:rPr lang="en-US" sz="2350" b="1" dirty="0" err="1">
+                <a:solidFill>
+                  <a:schemeClr val="bg1">
+                    <a:lumMod val="60000"/>
+                    <a:lumOff val="40000"/>
+                  </a:schemeClr>
                 </a:solidFill>
                 <a:ea typeface="+mn-lt"/>
                 <a:cs typeface="+mn-lt"/>
               </a:rPr>
-              <a:t> </a:t>
-            </a:r>
-            <a:r>
-              <a:rPr lang="en-US" sz="2350" b="1" dirty="0" err="1">
-                <a:solidFill>
-                  <a:srgbClr val="FFFFFF"/>
+              <a:t>нулевото</a:t>
+            </a:r>
+            <a:r>
+              <a:rPr lang="en-US" sz="2350" b="1" dirty="0">
+                <a:solidFill>
+                  <a:schemeClr val="bg1">
+                    <a:lumMod val="60000"/>
+                    <a:lumOff val="40000"/>
+                  </a:schemeClr>
                 </a:solidFill>
                 <a:ea typeface="+mn-lt"/>
                 <a:cs typeface="+mn-lt"/>
               </a:rPr>
-              <a:t>измрение</a:t>
-            </a:r>
-            <a:r>
-              <a:rPr lang="en-US" sz="2350" b="1" dirty="0">
-                <a:solidFill>
-                  <a:srgbClr val="FFFFFF"/>
+              <a:t> </a:t>
+            </a:r>
+            <a:r>
+              <a:rPr lang="en-US" sz="2350" b="1" dirty="0" err="1">
+                <a:solidFill>
+                  <a:schemeClr val="bg2"/>
                 </a:solidFill>
                 <a:ea typeface="+mn-lt"/>
                 <a:cs typeface="+mn-lt"/>
               </a:rPr>
-              <a:t> (</a:t>
+              <a:t>измрение</a:t>
+            </a:r>
+            <a:r>
+              <a:rPr lang="en-US" sz="2350" b="1" dirty="0">
+                <a:solidFill>
+                  <a:schemeClr val="bg1">
+                    <a:lumMod val="60000"/>
+                    <a:lumOff val="40000"/>
+                  </a:schemeClr>
+                </a:solidFill>
+                <a:ea typeface="+mn-lt"/>
+                <a:cs typeface="+mn-lt"/>
+              </a:rPr>
+              <a:t> </a:t>
+            </a:r>
+            <a:r>
+              <a:rPr lang="en-US" sz="2350" b="1" dirty="0">
+                <a:solidFill>
+                  <a:srgbClr val="FFFFFF"/>
+                </a:solidFill>
+                <a:ea typeface="+mn-lt"/>
+                <a:cs typeface="+mn-lt"/>
+              </a:rPr>
+              <a:t>(</a:t>
             </a:r>
             <a:r>
               <a:rPr lang="en-US" sz="2350" b="1" dirty="0" err="1">
@@ -13943,7 +14083,7 @@
               <a:rPr lang="en-US" sz="3600" dirty="0" err="1">
                 <a:cs typeface="Calibri"/>
               </a:rPr>
-              <a:t>колкона</a:t>
+              <a:t>колона</a:t>
             </a:r>
             <a:endParaRPr lang="en-US" sz="3600" dirty="0">
               <a:cs typeface="Calibri"/>
@@ -16404,7 +16544,7 @@
         </p:nvSpPr>
         <p:spPr bwMode="auto">
           <a:xfrm>
-            <a:off x="1396569" y="4010794"/>
+            <a:off x="1371000" y="4374000"/>
             <a:ext cx="3770918" cy="1938487"/>
           </a:xfrm>
           <a:prstGeom prst="rect">
@@ -16526,7 +16666,7 @@
         </p:nvSpPr>
         <p:spPr bwMode="auto">
           <a:xfrm>
-            <a:off x="6019820" y="4385442"/>
+            <a:off x="5994251" y="4748648"/>
             <a:ext cx="761802" cy="1200016"/>
           </a:xfrm>
           <a:prstGeom prst="rect">
@@ -16623,7 +16763,7 @@
         </p:nvSpPr>
         <p:spPr>
           <a:xfrm>
-            <a:off x="5365113" y="4831288"/>
+            <a:off x="5339544" y="5194494"/>
             <a:ext cx="457081" cy="297498"/>
           </a:xfrm>
           <a:prstGeom prst="rightArrow">
@@ -17074,24 +17214,34 @@
               <a:t> </a:t>
             </a:r>
             <a:r>
-              <a:rPr lang="en-US" sz="3600" b="1" dirty="0">
+              <a:rPr lang="en-US" sz="3600" b="1" dirty="0" err="1">
                 <a:solidFill>
                   <a:schemeClr val="bg1"/>
                 </a:solidFill>
                 <a:ea typeface="+mn-lt"/>
                 <a:cs typeface="+mn-lt"/>
               </a:rPr>
-              <a:t>с </a:t>
-            </a:r>
-            <a:r>
-              <a:rPr lang="en-US" sz="3600" b="1" dirty="0" err="1">
+              <a:t>с</a:t>
+            </a:r>
+            <a:r>
+              <a:rPr lang="en-US" sz="3600" b="1" dirty="0">
                 <a:solidFill>
                   <a:schemeClr val="bg1"/>
                 </a:solidFill>
                 <a:ea typeface="+mn-lt"/>
                 <a:cs typeface="+mn-lt"/>
               </a:rPr>
-              <a:t>дължина</a:t>
+              <a:t> </a:t>
+            </a:r>
+            <a:r>
+              <a:rPr lang="bg-BG" sz="3600" b="1" dirty="0">
+                <a:solidFill>
+                  <a:schemeClr val="bg1"/>
+                </a:solidFill>
+                <a:ea typeface="+mn-lt"/>
+                <a:cs typeface="+mn-lt"/>
+              </a:rPr>
+              <a:t>размери</a:t>
             </a:r>
             <a:r>
               <a:rPr lang="en-US" sz="3600" b="1" dirty="0">
@@ -17194,12 +17344,16 @@
               <a:t> </a:t>
             </a:r>
             <a:r>
+              <a:rPr lang="en-US" sz="3400" dirty="0" err="1"/>
+              <a:t>с</a:t>
+            </a:r>
+            <a:r>
               <a:rPr lang="en-US" sz="3400" dirty="0"/>
-              <a:t>с </a:t>
-            </a:r>
-            <a:r>
-              <a:rPr lang="en-US" sz="3400" dirty="0" err="1"/>
-              <a:t>дължина</a:t>
+              <a:t> </a:t>
+            </a:r>
+            <a:r>
+              <a:rPr lang="bg-BG" sz="3400" dirty="0"/>
+              <a:t>размери</a:t>
             </a:r>
             <a:r>
               <a:rPr lang="en-US" sz="3400" dirty="0"/>
@@ -19121,7 +19275,7 @@
         </p:nvSpPr>
         <p:spPr>
           <a:xfrm>
-            <a:off x="1867761" y="1248063"/>
+            <a:off x="1831205" y="977122"/>
             <a:ext cx="9924553" cy="5274674"/>
           </a:xfrm>
         </p:spPr>
@@ -19188,23 +19342,16 @@
               <a:t>масив</a:t>
             </a:r>
             <a:r>
-              <a:rPr lang="en-US" sz="3350" dirty="0"/>
-              <a:t> </a:t>
-            </a:r>
-            <a:endParaRPr lang="bg-BG" sz="3350" dirty="0"/>
-          </a:p>
-          <a:p>
-            <a:pPr lvl="1" indent="-360045">
-              <a:lnSpc>
-                <a:spcPct val="100000"/>
-              </a:lnSpc>
-              <a:buClr>
-                <a:srgbClr val="234465"/>
-              </a:buClr>
-            </a:pPr>
+              <a:rPr lang="bg-BG" sz="3350" dirty="0"/>
+              <a:t>, </a:t>
+            </a:r>
+            <a:r>
+              <a:rPr lang="bg-BG" sz="3350" dirty="0" err="1"/>
+              <a:t>н</a:t>
+            </a:r>
             <a:r>
               <a:rPr lang="en-US" sz="3150" dirty="0" err="1"/>
-              <a:t>Но</a:t>
+              <a:t>о</a:t>
             </a:r>
             <a:r>
               <a:rPr lang="en-US" sz="3150" dirty="0"/>
@@ -19246,7 +19393,7 @@
               <a:rPr lang="en-US" sz="3150" dirty="0" err="1"/>
               <a:t>дължина</a:t>
             </a:r>
-            <a:endParaRPr lang="en-US" sz="3150" dirty="0" err="1">
+            <a:endParaRPr lang="en-US" sz="3150" dirty="0">
               <a:cs typeface="Calibri"/>
             </a:endParaRPr>
           </a:p>
@@ -19578,7 +19725,7 @@
         </p:nvSpPr>
         <p:spPr bwMode="auto">
           <a:xfrm>
-            <a:off x="2855640" y="3813160"/>
+            <a:off x="2766000" y="3359255"/>
             <a:ext cx="5368394" cy="1200016"/>
           </a:xfrm>
           <a:prstGeom prst="rect">
@@ -19694,7 +19841,7 @@
         </p:nvSpPr>
         <p:spPr bwMode="auto">
           <a:xfrm>
-            <a:off x="2855640" y="5656419"/>
+            <a:off x="2766000" y="5364485"/>
             <a:ext cx="5368394" cy="461545"/>
           </a:xfrm>
           <a:prstGeom prst="rect">
@@ -19774,13 +19921,13 @@
         </p:nvSpPr>
         <p:spPr bwMode="auto">
           <a:xfrm>
-            <a:off x="4673754" y="6181948"/>
-            <a:ext cx="2086098" cy="656538"/>
+            <a:off x="4566668" y="6036180"/>
+            <a:ext cx="2086098" cy="754486"/>
           </a:xfrm>
           <a:prstGeom prst="wedgeRoundRectCallout">
             <a:avLst>
-              <a:gd name="adj1" fmla="val 33106"/>
-              <a:gd name="adj2" fmla="val -87686"/>
+              <a:gd name="adj1" fmla="val 38895"/>
+              <a:gd name="adj2" fmla="val -77396"/>
               <a:gd name="adj3" fmla="val 16667"/>
             </a:avLst>
           </a:prstGeom>
@@ -19885,13 +20032,13 @@
         </p:nvSpPr>
         <p:spPr bwMode="auto">
           <a:xfrm>
-            <a:off x="6918086" y="4814475"/>
-            <a:ext cx="1806701" cy="646512"/>
+            <a:off x="7536000" y="4644000"/>
+            <a:ext cx="1845000" cy="769213"/>
           </a:xfrm>
           <a:prstGeom prst="wedgeRoundRectCallout">
             <a:avLst>
-              <a:gd name="adj1" fmla="val -41321"/>
-              <a:gd name="adj2" fmla="val 106012"/>
+              <a:gd name="adj1" fmla="val -73582"/>
+              <a:gd name="adj2" fmla="val 51061"/>
               <a:gd name="adj3" fmla="val 16667"/>
             </a:avLst>
           </a:prstGeom>
@@ -20296,7 +20443,7 @@
                             </p:stCondLst>
                             <p:childTnLst>
                               <p:par>
-                                <p:cTn id="17" presetID="1" presetClass="entr" presetSubtype="0" fill="hold" nodeType="clickEffect">
+                                <p:cTn id="17" presetID="1" presetClass="entr" presetSubtype="0" fill="hold" grpId="0" nodeType="clickEffect">
                                   <p:stCondLst>
                                     <p:cond delay="0"/>
                                   </p:stCondLst>
@@ -20309,11 +20456,7 @@
                                           </p:stCondLst>
                                         </p:cTn>
                                         <p:tgtEl>
-                                          <p:spTgt spid="6">
-                                            <p:txEl>
-                                              <p:pRg st="3" end="3"/>
-                                            </p:txEl>
-                                          </p:spTgt>
+                                          <p:spTgt spid="18"/>
                                         </p:tgtEl>
                                         <p:attrNameLst>
                                           <p:attrName>style.visibility</p:attrName>
@@ -20345,7 +20488,7 @@
                             </p:stCondLst>
                             <p:childTnLst>
                               <p:par>
-                                <p:cTn id="21" presetID="1" presetClass="entr" presetSubtype="0" fill="hold" grpId="0" nodeType="clickEffect">
+                                <p:cTn id="21" presetID="1" presetClass="entr" presetSubtype="0" fill="hold" nodeType="clickEffect">
                                   <p:stCondLst>
                                     <p:cond delay="0"/>
                                   </p:stCondLst>
@@ -20358,7 +20501,11 @@
                                           </p:stCondLst>
                                         </p:cTn>
                                         <p:tgtEl>
-                                          <p:spTgt spid="18"/>
+                                          <p:spTgt spid="6">
+                                            <p:txEl>
+                                              <p:pRg st="5" end="5"/>
+                                            </p:txEl>
+                                          </p:spTgt>
                                         </p:tgtEl>
                                         <p:attrNameLst>
                                           <p:attrName>style.visibility</p:attrName>
@@ -20390,7 +20537,7 @@
                             </p:stCondLst>
                             <p:childTnLst>
                               <p:par>
-                                <p:cTn id="25" presetID="1" presetClass="entr" presetSubtype="0" fill="hold" nodeType="clickEffect">
+                                <p:cTn id="25" presetID="1" presetClass="entr" presetSubtype="0" fill="hold" grpId="0" nodeType="clickEffect">
                                   <p:stCondLst>
                                     <p:cond delay="0"/>
                                   </p:stCondLst>
@@ -20403,11 +20550,7 @@
                                           </p:stCondLst>
                                         </p:cTn>
                                         <p:tgtEl>
-                                          <p:spTgt spid="6">
-                                            <p:txEl>
-                                              <p:pRg st="6" end="6"/>
-                                            </p:txEl>
-                                          </p:spTgt>
+                                          <p:spTgt spid="7"/>
                                         </p:tgtEl>
                                         <p:attrNameLst>
                                           <p:attrName>style.visibility</p:attrName>
@@ -20452,7 +20595,7 @@
                                           </p:stCondLst>
                                         </p:cTn>
                                         <p:tgtEl>
-                                          <p:spTgt spid="7"/>
+                                          <p:spTgt spid="8"/>
                                         </p:tgtEl>
                                         <p:attrNameLst>
                                           <p:attrName>style.visibility</p:attrName>
@@ -20492,51 +20635,6 @@
                                     <p:set>
                                       <p:cBhvr>
                                         <p:cTn id="34" dur="1" fill="hold">
-                                          <p:stCondLst>
-                                            <p:cond delay="0"/>
-                                          </p:stCondLst>
-                                        </p:cTn>
-                                        <p:tgtEl>
-                                          <p:spTgt spid="8"/>
-                                        </p:tgtEl>
-                                        <p:attrNameLst>
-                                          <p:attrName>style.visibility</p:attrName>
-                                        </p:attrNameLst>
-                                      </p:cBhvr>
-                                      <p:to>
-                                        <p:strVal val="visible"/>
-                                      </p:to>
-                                    </p:set>
-                                  </p:childTnLst>
-                                </p:cTn>
-                              </p:par>
-                            </p:childTnLst>
-                          </p:cTn>
-                        </p:par>
-                      </p:childTnLst>
-                    </p:cTn>
-                  </p:par>
-                  <p:par>
-                    <p:cTn id="35" fill="hold">
-                      <p:stCondLst>
-                        <p:cond delay="indefinite"/>
-                      </p:stCondLst>
-                      <p:childTnLst>
-                        <p:par>
-                          <p:cTn id="36" fill="hold">
-                            <p:stCondLst>
-                              <p:cond delay="0"/>
-                            </p:stCondLst>
-                            <p:childTnLst>
-                              <p:par>
-                                <p:cTn id="37" presetID="1" presetClass="entr" presetSubtype="0" fill="hold" grpId="0" nodeType="clickEffect">
-                                  <p:stCondLst>
-                                    <p:cond delay="0"/>
-                                  </p:stCondLst>
-                                  <p:childTnLst>
-                                    <p:set>
-                                      <p:cBhvr>
-                                        <p:cTn id="38" dur="1" fill="hold">
                                           <p:stCondLst>
                                             <p:cond delay="0"/>
                                           </p:stCondLst>
@@ -20664,7 +20762,7 @@
               </a:rPr>
               <a:t>масиви</a:t>
             </a:r>
-            <a:endParaRPr lang="en-GB" sz="3550" b="1">
+            <a:endParaRPr lang="en-GB" sz="3550" b="1" dirty="0">
               <a:solidFill>
                 <a:schemeClr val="bg1"/>
               </a:solidFill>
@@ -20868,7 +20966,7 @@
               </a:rPr>
               <a:t>елементи</a:t>
             </a:r>
-            <a:endParaRPr lang="en-GB" sz="3350">
+            <a:endParaRPr lang="en-GB" sz="3350" dirty="0">
               <a:ea typeface="+mn-lt"/>
               <a:cs typeface="+mn-lt"/>
             </a:endParaRPr>
@@ -20900,7 +20998,7 @@
               </a:rPr>
               <a:t>отпечатване</a:t>
             </a:r>
-            <a:endParaRPr lang="en-GB" sz="3350">
+            <a:endParaRPr lang="en-GB" sz="3350" dirty="0">
               <a:ea typeface="+mn-lt"/>
               <a:cs typeface="+mn-lt"/>
             </a:endParaRPr>
@@ -23260,24 +23358,9 @@
               <a:rPr lang="en-GB" sz="3400" dirty="0" err="1"/>
               <a:t>елементите</a:t>
             </a:r>
-            <a:endParaRPr lang="en-GB" sz="3400" dirty="0" err="1">
-              <a:cs typeface="Calibri"/>
-            </a:endParaRPr>
-          </a:p>
-          <a:p>
-            <a:pPr marL="0" indent="0">
-              <a:lnSpc>
-                <a:spcPct val="100000"/>
-              </a:lnSpc>
-              <a:spcBef>
-                <a:spcPts val="1200"/>
-              </a:spcBef>
-              <a:buNone/>
-            </a:pPr>
-            <a:r>
-              <a:rPr lang="en-GB" sz="3400" dirty="0"/>
-              <a:t>    </a:t>
-            </a:r>
+            <a:br>
+              <a:rPr lang="bg-BG" sz="3400" dirty="0"/>
+            </a:br>
             <a:r>
               <a:rPr lang="en-GB" sz="3400" dirty="0" err="1"/>
               <a:t>за</a:t>
@@ -23298,7 +23381,7 @@
               <a:rPr lang="en-GB" sz="3400" dirty="0" err="1"/>
               <a:t>редица</a:t>
             </a:r>
-            <a:endParaRPr lang="en-GB" sz="3400" dirty="0" err="1">
+            <a:endParaRPr lang="en-GB" sz="3400" dirty="0">
               <a:cs typeface="Calibri"/>
             </a:endParaRPr>
           </a:p>
@@ -23360,7 +23443,7 @@
               <a:rPr lang="en-GB" sz="3400" dirty="0" err="1"/>
               <a:t>командите</a:t>
             </a:r>
-            <a:endParaRPr lang="en-GB" sz="3400" dirty="0" err="1">
+            <a:endParaRPr lang="en-GB" sz="3400" dirty="0">
               <a:cs typeface="Calibri"/>
             </a:endParaRPr>
           </a:p>
@@ -23374,8 +23457,8 @@
               </a:spcBef>
             </a:pPr>
             <a:r>
-              <a:rPr lang="en-GB" sz="3200" dirty="0" err="1"/>
-              <a:t>Добави</a:t>
+              <a:rPr lang="en-GB" sz="3200" dirty="0"/>
+              <a:t>Add</a:t>
             </a:r>
             <a:r>
               <a:rPr lang="en-GB" sz="3200" dirty="0">
@@ -23461,12 +23544,8 @@
               </a:spcBef>
             </a:pPr>
             <a:r>
-              <a:rPr lang="en-GB" sz="3200" dirty="0" err="1"/>
-              <a:t>Извади</a:t>
-            </a:r>
-            <a:r>
               <a:rPr lang="en-GB" sz="3200" dirty="0"/>
-              <a:t> </a:t>
+              <a:t>Subtract </a:t>
             </a:r>
             <a:r>
               <a:rPr lang="en-GB" sz="3200" dirty="0">
@@ -23558,12 +23637,20 @@
               <a:t> </a:t>
             </a:r>
             <a:r>
+              <a:rPr lang="bg-BG" sz="3400" dirty="0" err="1">
+                <a:solidFill>
+                  <a:srgbClr val="234465"/>
+                </a:solidFill>
+              </a:rPr>
+              <a:t>коо</a:t>
+            </a:r>
+            <a:r>
               <a:rPr lang="en-GB" sz="3400" dirty="0" err="1">
                 <a:solidFill>
                   <a:srgbClr val="234465"/>
                 </a:solidFill>
               </a:rPr>
-              <a:t>кординатите</a:t>
+              <a:t>рдинатите</a:t>
             </a:r>
             <a:r>
               <a:rPr lang="en-GB" sz="3400" dirty="0">
@@ -23598,12 +23685,12 @@
               <a:t>невалидни</a:t>
             </a:r>
             <a:r>
-              <a:rPr lang="en-GB" sz="3400" dirty="0">
+              <a:rPr lang="bg-BG" sz="3400" dirty="0">
                 <a:solidFill>
                   <a:srgbClr val="234465"/>
                 </a:solidFill>
               </a:rPr>
-              <a:t> </a:t>
+              <a:t>, </a:t>
             </a:r>
             <a:r>
               <a:rPr lang="en-GB" sz="3400" dirty="0" err="1">
@@ -23693,7 +23780,15 @@
             </a:r>
             <a:r>
               <a:rPr lang="en-GB" sz="3400" dirty="0"/>
-              <a:t>" </a:t>
+              <a:t>“</a:t>
+            </a:r>
+            <a:r>
+              <a:rPr lang="bg-BG" sz="3400" dirty="0"/>
+              <a:t>,</a:t>
+            </a:r>
+            <a:r>
+              <a:rPr lang="en-GB" sz="3400" dirty="0"/>
+              <a:t> </a:t>
             </a:r>
             <a:r>
               <a:rPr lang="en-GB" sz="3400" dirty="0" err="1"/>
@@ -23715,7 +23810,7 @@
               <a:rPr lang="en-GB" sz="3400" dirty="0" err="1"/>
               <a:t>масив</a:t>
             </a:r>
-            <a:endParaRPr lang="en-GB" sz="3400" dirty="0" err="1">
+            <a:endParaRPr lang="en-GB" sz="3400" dirty="0">
               <a:cs typeface="Calibri"/>
             </a:endParaRPr>
           </a:p>
@@ -24301,55 +24396,6 @@
                       </p:childTnLst>
                     </p:cTn>
                   </p:par>
-                  <p:par>
-                    <p:cTn id="31" fill="hold">
-                      <p:stCondLst>
-                        <p:cond delay="indefinite"/>
-                      </p:stCondLst>
-                      <p:childTnLst>
-                        <p:par>
-                          <p:cTn id="32" fill="hold">
-                            <p:stCondLst>
-                              <p:cond delay="0"/>
-                            </p:stCondLst>
-                            <p:childTnLst>
-                              <p:par>
-                                <p:cTn id="33" presetID="1" presetClass="entr" presetSubtype="0" fill="hold" nodeType="clickEffect">
-                                  <p:stCondLst>
-                                    <p:cond delay="0"/>
-                                  </p:stCondLst>
-                                  <p:childTnLst>
-                                    <p:set>
-                                      <p:cBhvr>
-                                        <p:cTn id="34" dur="1" fill="hold">
-                                          <p:stCondLst>
-                                            <p:cond delay="0"/>
-                                          </p:stCondLst>
-                                        </p:cTn>
-                                        <p:tgtEl>
-                                          <p:spTgt spid="7">
-                                            <p:txEl>
-                                              <p:pRg st="7" end="7"/>
-                                            </p:txEl>
-                                          </p:spTgt>
-                                        </p:tgtEl>
-                                        <p:attrNameLst>
-                                          <p:attrName>style.visibility</p:attrName>
-                                        </p:attrNameLst>
-                                      </p:cBhvr>
-                                      <p:to>
-                                        <p:strVal val="visible"/>
-                                      </p:to>
-                                    </p:set>
-                                  </p:childTnLst>
-                                </p:cTn>
-                              </p:par>
-                            </p:childTnLst>
-                          </p:cTn>
-                        </p:par>
-                      </p:childTnLst>
-                    </p:cTn>
-                  </p:par>
                 </p:childTnLst>
               </p:cTn>
               <p:prevCondLst>
@@ -24576,7 +24622,25 @@
                 </a:solidFill>
                 <a:latin typeface="Consolas"/>
               </a:rPr>
-              <a:t>// продължаваме на следващият слайд</a:t>
+              <a:t>// </a:t>
+            </a:r>
+            <a:r>
+              <a:rPr lang="bg-BG" sz="2600" b="1" i="1" noProof="1">
+                <a:solidFill>
+                  <a:schemeClr val="accent2"/>
+                </a:solidFill>
+                <a:latin typeface="Consolas"/>
+              </a:rPr>
+              <a:t>П</a:t>
+            </a:r>
+            <a:r>
+              <a:rPr lang="en-US" sz="2600" b="1" i="1" noProof="1">
+                <a:solidFill>
+                  <a:schemeClr val="accent2"/>
+                </a:solidFill>
+                <a:latin typeface="Consolas"/>
+              </a:rPr>
+              <a:t>родължаваме на следващия слайд</a:t>
             </a:r>
             <a:endParaRPr lang="en-US" sz="2600" b="1" i="1" noProof="1">
               <a:solidFill>
@@ -25363,7 +25427,25 @@
                 </a:solidFill>
                 <a:latin typeface="Consolas"/>
               </a:rPr>
-              <a:t> Да напишете командите</a:t>
+              <a:t> </a:t>
+            </a:r>
+            <a:r>
+              <a:rPr lang="bg-BG" sz="2600" b="1" i="1" noProof="1">
+                <a:solidFill>
+                  <a:schemeClr val="accent2"/>
+                </a:solidFill>
+                <a:latin typeface="Consolas"/>
+              </a:rPr>
+              <a:t>Напишете </a:t>
+            </a:r>
+            <a:r>
+              <a:rPr lang="en-US" sz="2600" b="1" i="1" noProof="1">
+                <a:solidFill>
+                  <a:schemeClr val="accent2"/>
+                </a:solidFill>
+                <a:latin typeface="Consolas"/>
+              </a:rPr>
+              <a:t>командите</a:t>
             </a:r>
             <a:r>
               <a:rPr lang="en-US" sz="2600" b="1" noProof="1">
@@ -25406,7 +25488,25 @@
                 </a:solidFill>
                 <a:latin typeface="Consolas"/>
               </a:rPr>
-              <a:t> Да се отпечата матрицата</a:t>
+              <a:t> </a:t>
+            </a:r>
+            <a:r>
+              <a:rPr lang="bg-BG" sz="2600" b="1" i="1" noProof="1">
+                <a:solidFill>
+                  <a:schemeClr val="accent2"/>
+                </a:solidFill>
+                <a:latin typeface="Consolas"/>
+              </a:rPr>
+              <a:t>Отпечатайте </a:t>
+            </a:r>
+            <a:r>
+              <a:rPr lang="en-US" sz="2600" b="1" i="1" noProof="1">
+                <a:solidFill>
+                  <a:schemeClr val="accent2"/>
+                </a:solidFill>
+                <a:latin typeface="Consolas"/>
+              </a:rPr>
+              <a:t>матрицата</a:t>
             </a:r>
             <a:endParaRPr lang="en-US" sz="2600" b="1" i="1" noProof="1">
               <a:solidFill>
@@ -27506,8 +27606,8 @@
         </p:nvSpPr>
         <p:spPr bwMode="auto">
           <a:xfrm>
-            <a:off x="744501" y="1160295"/>
-            <a:ext cx="10507820" cy="5693866"/>
+            <a:off x="744500" y="1160295"/>
+            <a:ext cx="11008529" cy="5693866"/>
           </a:xfrm>
           <a:prstGeom prst="rect">
             <a:avLst/>
@@ -27883,7 +27983,26 @@
                 <a:latin typeface="Consolas"/>
                 <a:cs typeface="Consolas" pitchFamily="49" charset="0"/>
               </a:rPr>
-              <a:t> Да се запълнят елементите на всяка редица (следващият слайд)</a:t>
+              <a:t> Да се запълнят елементите на всяка редица </a:t>
+            </a:r>
+            <a:br>
+              <a:rPr lang="en-US" sz="2800" b="1" i="1" noProof="1">
+                <a:solidFill>
+                  <a:schemeClr val="accent2"/>
+                </a:solidFill>
+                <a:latin typeface="Consolas"/>
+                <a:cs typeface="Consolas" pitchFamily="49" charset="0"/>
+              </a:rPr>
+            </a:br>
+            <a:r>
+              <a:rPr lang="en-US" sz="2800" b="1" i="1" noProof="1">
+                <a:solidFill>
+                  <a:schemeClr val="accent2"/>
+                </a:solidFill>
+                <a:latin typeface="Consolas"/>
+                <a:cs typeface="Consolas" pitchFamily="49" charset="0"/>
+              </a:rPr>
+              <a:t>    (следващият слайд)</a:t>
             </a:r>
           </a:p>
           <a:p>
@@ -34177,7 +34296,7 @@
         </p:nvSpPr>
         <p:spPr>
           <a:xfrm>
-            <a:off x="1876026" y="1050959"/>
+            <a:off x="1807503" y="908645"/>
             <a:ext cx="10129234" cy="5546589"/>
           </a:xfrm>
         </p:spPr>
@@ -34281,7 +34400,7 @@
               </a:rPr>
               <a:t>обекти</a:t>
             </a:r>
-            <a:endParaRPr lang="en-US" sz="3400" b="1">
+            <a:endParaRPr lang="en-US" sz="3400" b="1" dirty="0">
               <a:solidFill>
                 <a:schemeClr val="bg1"/>
               </a:solidFill>
@@ -34298,20 +34417,12 @@
               </a:buClr>
             </a:pPr>
             <a:r>
-              <a:rPr lang="en-US" sz="3400" b="1" dirty="0" err="1">
+              <a:rPr lang="en-US" sz="3400" b="1" dirty="0">
                 <a:solidFill>
                   <a:schemeClr val="bg1"/>
                 </a:solidFill>
               </a:rPr>
-              <a:t>Многомерните</a:t>
-            </a:r>
-            <a:r>
-              <a:rPr lang="en-US" sz="3400" b="1" dirty="0">
-                <a:solidFill>
-                  <a:schemeClr val="bg1"/>
-                </a:solidFill>
-              </a:rPr>
-              <a:t> </a:t>
+              <a:t>Многомерните </a:t>
             </a:r>
             <a:r>
               <a:rPr lang="en-US" sz="3400" b="1" dirty="0" err="1">
@@ -34365,7 +34476,7 @@
               <a:rPr lang="en-US" sz="3400" dirty="0" err="1"/>
               <a:t>измерение</a:t>
             </a:r>
-            <a:endParaRPr lang="en-US" sz="3400" dirty="0" err="1">
+            <a:endParaRPr lang="en-US" sz="3400" dirty="0">
               <a:cs typeface="Calibri"/>
             </a:endParaRPr>
           </a:p>
@@ -35406,27 +35517,23 @@
             </a:r>
             <a:r>
               <a:rPr lang="en-GB" sz="3400" dirty="0"/>
-              <a:t> е </a:t>
+              <a:t> </a:t>
+            </a:r>
+            <a:r>
+              <a:rPr lang="bg-BG" sz="3400" dirty="0"/>
+              <a:t>се използва </a:t>
             </a:r>
             <a:r>
               <a:rPr lang="en-GB" sz="3400" dirty="0" err="1"/>
-              <a:t>единствено</a:t>
+              <a:t>само</a:t>
             </a:r>
             <a:r>
               <a:rPr lang="en-GB" sz="3400" dirty="0"/>
               <a:t> </a:t>
             </a:r>
             <a:r>
-              <a:rPr lang="en-GB" sz="3400" dirty="0" err="1"/>
-              <a:t>само</a:t>
-            </a:r>
-            <a:r>
-              <a:rPr lang="en-GB" sz="3400" dirty="0"/>
-              <a:t> </a:t>
-            </a:r>
-            <a:r>
-              <a:rPr lang="en-GB" sz="3400" dirty="0" err="1"/>
-              <a:t>за</a:t>
+              <a:rPr lang="bg-BG" sz="3400" dirty="0"/>
+              <a:t>в</a:t>
             </a:r>
             <a:r>
               <a:rPr lang="en-GB" sz="3400" dirty="0"/>
@@ -36353,17 +36460,16 @@
               <a:lnSpc>
                 <a:spcPct val="100000"/>
               </a:lnSpc>
+              <a:spcBef>
+                <a:spcPts val="2500"/>
+              </a:spcBef>
               <a:buClr>
                 <a:srgbClr val="234465"/>
               </a:buClr>
             </a:pPr>
             <a:r>
-              <a:rPr lang="en-US" sz="3600" dirty="0" err="1"/>
-              <a:t>Многомерните</a:t>
-            </a:r>
-            <a:r>
               <a:rPr lang="en-US" sz="3600" dirty="0"/>
-              <a:t> </a:t>
+              <a:t>Многомерните </a:t>
             </a:r>
             <a:r>
               <a:rPr lang="en-US" sz="3600" dirty="0" err="1"/>
@@ -37506,7 +37612,23 @@
                   <a:srgbClr val="234465"/>
                 </a:solidFill>
               </a:rPr>
-              <a:t>стойноста</a:t>
+              <a:t>стойност</a:t>
+            </a:r>
+            <a:r>
+              <a:rPr lang="bg-BG" sz="3350" dirty="0" err="1">
+                <a:solidFill>
+                  <a:srgbClr val="234465"/>
+                </a:solidFill>
+              </a:rPr>
+              <a:t>т</a:t>
+            </a:r>
+            <a:r>
+              <a:rPr lang="en-US" sz="3350" dirty="0" err="1">
+                <a:solidFill>
+                  <a:srgbClr val="234465"/>
+                </a:solidFill>
+              </a:rPr>
+              <a:t>а</a:t>
             </a:r>
             <a:r>
               <a:rPr lang="en-US" sz="3350" dirty="0">
@@ -37602,12 +37724,12 @@
               </a:buClr>
             </a:pPr>
             <a:r>
-              <a:rPr lang="en-US" sz="3350" b="1" dirty="0" err="1">
+              <a:rPr lang="bg-BG" sz="3350" b="1" dirty="0">
                 <a:solidFill>
                   <a:schemeClr val="bg1"/>
                 </a:solidFill>
               </a:rPr>
-              <a:t>Слагане</a:t>
+              <a:t>Задаване</a:t>
             </a:r>
             <a:r>
               <a:rPr lang="en-US" sz="3350" b="1" dirty="0">
@@ -38041,7 +38163,24 @@
                 <a:latin typeface="Consolas" pitchFamily="49" charset="0"/>
                 <a:cs typeface="Consolas" pitchFamily="49" charset="0"/>
               </a:rPr>
-              <a:t>for (int row = 0; row &lt; array.GetLength(0); row++)</a:t>
+              <a:t>for (int row = 0; row &lt; </a:t>
+            </a:r>
+            <a:r>
+              <a:rPr lang="en-US" sz="2399" b="1" noProof="1">
+                <a:solidFill>
+                  <a:schemeClr val="bg1"/>
+                </a:solidFill>
+                <a:latin typeface="Consolas" pitchFamily="49" charset="0"/>
+                <a:cs typeface="Consolas" pitchFamily="49" charset="0"/>
+              </a:rPr>
+              <a:t>array.GetLength(0); </a:t>
+            </a:r>
+            <a:r>
+              <a:rPr lang="en-US" sz="2399" b="1" noProof="1">
+                <a:latin typeface="Consolas" pitchFamily="49" charset="0"/>
+                <a:cs typeface="Consolas" pitchFamily="49" charset="0"/>
+              </a:rPr>
+              <a:t>row++)</a:t>
             </a:r>
           </a:p>
           <a:p>
@@ -38113,8 +38252,8 @@
         </p:nvSpPr>
         <p:spPr bwMode="auto">
           <a:xfrm>
-            <a:off x="7917308" y="4131995"/>
-            <a:ext cx="2713608" cy="835994"/>
+            <a:off x="7917308" y="4059000"/>
+            <a:ext cx="2713608" cy="908989"/>
           </a:xfrm>
           <a:prstGeom prst="wedgeRoundRectCallout">
             <a:avLst>
@@ -38185,7 +38324,10 @@
             <a:r>
               <a:rPr lang="en-GB" sz="2350" b="1" dirty="0" err="1">
                 <a:solidFill>
-                  <a:srgbClr val="FFFFFF"/>
+                  <a:schemeClr val="bg1">
+                    <a:lumMod val="60000"/>
+                    <a:lumOff val="40000"/>
+                  </a:schemeClr>
                 </a:solidFill>
                 <a:cs typeface="Calibri"/>
               </a:rPr>
@@ -39587,7 +39729,25 @@
                   <a:schemeClr val="bg1"/>
                 </a:solidFill>
               </a:rPr>
-              <a:t> foreach-</a:t>
+              <a:t> </a:t>
+            </a:r>
+            <a:r>
+              <a:rPr lang="en-GB" sz="3350" b="1" dirty="0">
+                <a:solidFill>
+                  <a:schemeClr val="bg1"/>
+                </a:solidFill>
+                <a:latin typeface="Consolas" panose="020B0609020204030204" pitchFamily="49" charset="0"/>
+                <a:cs typeface="Consolas" panose="020B0609020204030204" pitchFamily="49" charset="0"/>
+              </a:rPr>
+              <a:t>foreach</a:t>
+            </a:r>
+            <a:r>
+              <a:rPr lang="en-GB" sz="3350" b="1" dirty="0">
+                <a:solidFill>
+                  <a:schemeClr val="bg1"/>
+                </a:solidFill>
+              </a:rPr>
+              <a:t>-</a:t>
             </a:r>
             <a:r>
               <a:rPr lang="en-GB" sz="3350" b="1" dirty="0" err="1">
@@ -39743,7 +39903,7 @@
         </p:nvSpPr>
         <p:spPr bwMode="auto">
           <a:xfrm>
-            <a:off x="647104" y="2312508"/>
+            <a:off x="606000" y="2413572"/>
             <a:ext cx="5912847" cy="4093428"/>
           </a:xfrm>
           <a:prstGeom prst="rect">

</xml_diff>